<commit_message>
Animator Initial & jsoncpp
</commit_message>
<xml_diff>
--- a/RollBall/roll_ball.pptx
+++ b/RollBall/roll_ball.pptx
@@ -328,7 +328,7 @@
           <a:p>
             <a:fld id="{55484BE3-27E7-49EA-9085-01EC175E6EED}" type="datetimeFigureOut">
               <a:rPr lang="ko-KR" altLang="en-US" smtClean="0"/>
-              <a:t>2021-08-05</a:t>
+              <a:t>2021-08-08</a:t>
             </a:fld>
             <a:endParaRPr lang="ko-KR" altLang="en-US"/>
           </a:p>
@@ -518,7 +518,7 @@
           <a:p>
             <a:fld id="{55484BE3-27E7-49EA-9085-01EC175E6EED}" type="datetimeFigureOut">
               <a:rPr lang="ko-KR" altLang="en-US" smtClean="0"/>
-              <a:t>2021-08-05</a:t>
+              <a:t>2021-08-08</a:t>
             </a:fld>
             <a:endParaRPr lang="ko-KR" altLang="en-US"/>
           </a:p>
@@ -698,7 +698,7 @@
           <a:p>
             <a:fld id="{55484BE3-27E7-49EA-9085-01EC175E6EED}" type="datetimeFigureOut">
               <a:rPr lang="ko-KR" altLang="en-US" smtClean="0"/>
-              <a:t>2021-08-05</a:t>
+              <a:t>2021-08-08</a:t>
             </a:fld>
             <a:endParaRPr lang="ko-KR" altLang="en-US"/>
           </a:p>
@@ -868,7 +868,7 @@
           <a:p>
             <a:fld id="{55484BE3-27E7-49EA-9085-01EC175E6EED}" type="datetimeFigureOut">
               <a:rPr lang="ko-KR" altLang="en-US" smtClean="0"/>
-              <a:t>2021-08-05</a:t>
+              <a:t>2021-08-08</a:t>
             </a:fld>
             <a:endParaRPr lang="ko-KR" altLang="en-US"/>
           </a:p>
@@ -1124,7 +1124,7 @@
           <a:p>
             <a:fld id="{55484BE3-27E7-49EA-9085-01EC175E6EED}" type="datetimeFigureOut">
               <a:rPr lang="ko-KR" altLang="en-US" smtClean="0"/>
-              <a:t>2021-08-05</a:t>
+              <a:t>2021-08-08</a:t>
             </a:fld>
             <a:endParaRPr lang="ko-KR" altLang="en-US"/>
           </a:p>
@@ -1412,7 +1412,7 @@
           <a:p>
             <a:fld id="{55484BE3-27E7-49EA-9085-01EC175E6EED}" type="datetimeFigureOut">
               <a:rPr lang="ko-KR" altLang="en-US" smtClean="0"/>
-              <a:t>2021-08-05</a:t>
+              <a:t>2021-08-08</a:t>
             </a:fld>
             <a:endParaRPr lang="ko-KR" altLang="en-US"/>
           </a:p>
@@ -1850,7 +1850,7 @@
           <a:p>
             <a:fld id="{55484BE3-27E7-49EA-9085-01EC175E6EED}" type="datetimeFigureOut">
               <a:rPr lang="ko-KR" altLang="en-US" smtClean="0"/>
-              <a:t>2021-08-05</a:t>
+              <a:t>2021-08-08</a:t>
             </a:fld>
             <a:endParaRPr lang="ko-KR" altLang="en-US"/>
           </a:p>
@@ -1968,7 +1968,7 @@
           <a:p>
             <a:fld id="{55484BE3-27E7-49EA-9085-01EC175E6EED}" type="datetimeFigureOut">
               <a:rPr lang="ko-KR" altLang="en-US" smtClean="0"/>
-              <a:t>2021-08-05</a:t>
+              <a:t>2021-08-08</a:t>
             </a:fld>
             <a:endParaRPr lang="ko-KR" altLang="en-US"/>
           </a:p>
@@ -2063,7 +2063,7 @@
           <a:p>
             <a:fld id="{55484BE3-27E7-49EA-9085-01EC175E6EED}" type="datetimeFigureOut">
               <a:rPr lang="ko-KR" altLang="en-US" smtClean="0"/>
-              <a:t>2021-08-05</a:t>
+              <a:t>2021-08-08</a:t>
             </a:fld>
             <a:endParaRPr lang="ko-KR" altLang="en-US"/>
           </a:p>
@@ -2419,7 +2419,7 @@
           <a:p>
             <a:fld id="{55484BE3-27E7-49EA-9085-01EC175E6EED}" type="datetimeFigureOut">
               <a:rPr lang="ko-KR" altLang="en-US" smtClean="0"/>
-              <a:t>2021-08-05</a:t>
+              <a:t>2021-08-08</a:t>
             </a:fld>
             <a:endParaRPr lang="ko-KR" altLang="en-US"/>
           </a:p>
@@ -2735,7 +2735,7 @@
           <a:p>
             <a:fld id="{55484BE3-27E7-49EA-9085-01EC175E6EED}" type="datetimeFigureOut">
               <a:rPr lang="ko-KR" altLang="en-US" smtClean="0"/>
-              <a:t>2021-08-05</a:t>
+              <a:t>2021-08-08</a:t>
             </a:fld>
             <a:endParaRPr lang="ko-KR" altLang="en-US"/>
           </a:p>
@@ -2968,7 +2968,7 @@
           <a:p>
             <a:fld id="{55484BE3-27E7-49EA-9085-01EC175E6EED}" type="datetimeFigureOut">
               <a:rPr lang="ko-KR" altLang="en-US" smtClean="0"/>
-              <a:t>2021-08-05</a:t>
+              <a:t>2021-08-08</a:t>
             </a:fld>
             <a:endParaRPr lang="ko-KR" altLang="en-US"/>
           </a:p>
@@ -7157,109 +7157,6 @@
       </p:grpSpPr>
       <p:sp>
         <p:nvSpPr>
-          <p:cNvPr id="4" name="직사각형 3">
-            <a:extLst>
-              <a:ext uri="{FF2B5EF4-FFF2-40B4-BE49-F238E27FC236}">
-                <a16:creationId xmlns:a16="http://schemas.microsoft.com/office/drawing/2014/main" id="{FD0CC5A6-D7F5-4308-A1AD-4994B8F1AB59}"/>
-              </a:ext>
-            </a:extLst>
-          </p:cNvPr>
-          <p:cNvSpPr/>
-          <p:nvPr/>
-        </p:nvSpPr>
-        <p:spPr>
-          <a:xfrm>
-            <a:off x="6244590" y="2011680"/>
-            <a:ext cx="1977390" cy="822960"/>
-          </a:xfrm>
-          <a:prstGeom prst="rect">
-            <a:avLst/>
-          </a:prstGeom>
-        </p:spPr>
-        <p:style>
-          <a:lnRef idx="2">
-            <a:schemeClr val="dk1">
-              <a:shade val="50000"/>
-            </a:schemeClr>
-          </a:lnRef>
-          <a:fillRef idx="1">
-            <a:schemeClr val="dk1"/>
-          </a:fillRef>
-          <a:effectRef idx="0">
-            <a:schemeClr val="dk1"/>
-          </a:effectRef>
-          <a:fontRef idx="minor">
-            <a:schemeClr val="lt1"/>
-          </a:fontRef>
-        </p:style>
-        <p:txBody>
-          <a:bodyPr rtlCol="0" anchor="ctr"/>
-          <a:lstStyle/>
-          <a:p>
-            <a:pPr algn="ctr"/>
-            <a:r>
-              <a:rPr lang="ko-KR" altLang="en-US" dirty="0"/>
-              <a:t>슈퍼</a:t>
-            </a:r>
-          </a:p>
-        </p:txBody>
-      </p:sp>
-      <p:sp>
-        <p:nvSpPr>
-          <p:cNvPr id="5" name="직사각형 4">
-            <a:extLst>
-              <a:ext uri="{FF2B5EF4-FFF2-40B4-BE49-F238E27FC236}">
-                <a16:creationId xmlns:a16="http://schemas.microsoft.com/office/drawing/2014/main" id="{45CA377C-5F6D-4F23-9B95-F6AF925CCC90}"/>
-              </a:ext>
-            </a:extLst>
-          </p:cNvPr>
-          <p:cNvSpPr/>
-          <p:nvPr/>
-        </p:nvSpPr>
-        <p:spPr>
-          <a:xfrm>
-            <a:off x="3829050" y="2011680"/>
-            <a:ext cx="1977390" cy="822960"/>
-          </a:xfrm>
-          <a:prstGeom prst="rect">
-            <a:avLst/>
-          </a:prstGeom>
-        </p:spPr>
-        <p:style>
-          <a:lnRef idx="2">
-            <a:schemeClr val="dk1">
-              <a:shade val="50000"/>
-            </a:schemeClr>
-          </a:lnRef>
-          <a:fillRef idx="1">
-            <a:schemeClr val="dk1"/>
-          </a:fillRef>
-          <a:effectRef idx="0">
-            <a:schemeClr val="dk1"/>
-          </a:effectRef>
-          <a:fontRef idx="minor">
-            <a:schemeClr val="lt1"/>
-          </a:fontRef>
-        </p:style>
-        <p:txBody>
-          <a:bodyPr rtlCol="0" anchor="ctr"/>
-          <a:lstStyle/>
-          <a:p>
-            <a:pPr algn="ctr"/>
-            <a:r>
-              <a:rPr lang="ko-KR" altLang="en-US" dirty="0"/>
-              <a:t>서브 </a:t>
-            </a:r>
-            <a:r>
-              <a:rPr lang="en-US" altLang="ko-KR" dirty="0"/>
-              <a:t>8</a:t>
-            </a:r>
-            <a:endParaRPr lang="ko-KR" altLang="en-US" dirty="0"/>
-          </a:p>
-        </p:txBody>
-      </p:sp>
-      <p:sp>
-        <p:nvSpPr>
           <p:cNvPr id="6" name="직사각형 5">
             <a:extLst>
               <a:ext uri="{FF2B5EF4-FFF2-40B4-BE49-F238E27FC236}">
@@ -7314,104 +7211,6 @@
       </p:sp>
       <p:sp>
         <p:nvSpPr>
-          <p:cNvPr id="7" name="직사각형 6">
-            <a:extLst>
-              <a:ext uri="{FF2B5EF4-FFF2-40B4-BE49-F238E27FC236}">
-                <a16:creationId xmlns:a16="http://schemas.microsoft.com/office/drawing/2014/main" id="{DEC296E9-1788-458A-8D8C-53D58B52473B}"/>
-              </a:ext>
-            </a:extLst>
-          </p:cNvPr>
-          <p:cNvSpPr/>
-          <p:nvPr/>
-        </p:nvSpPr>
-        <p:spPr>
-          <a:xfrm>
-            <a:off x="1413510" y="3200401"/>
-            <a:ext cx="1977390" cy="822960"/>
-          </a:xfrm>
-          <a:prstGeom prst="rect">
-            <a:avLst/>
-          </a:prstGeom>
-        </p:spPr>
-        <p:style>
-          <a:lnRef idx="2">
-            <a:schemeClr val="dk1">
-              <a:shade val="50000"/>
-            </a:schemeClr>
-          </a:lnRef>
-          <a:fillRef idx="1">
-            <a:schemeClr val="dk1"/>
-          </a:fillRef>
-          <a:effectRef idx="0">
-            <a:schemeClr val="dk1"/>
-          </a:effectRef>
-          <a:fontRef idx="minor">
-            <a:schemeClr val="lt1"/>
-          </a:fontRef>
-        </p:style>
-        <p:txBody>
-          <a:bodyPr rtlCol="0" anchor="ctr"/>
-          <a:lstStyle/>
-          <a:p>
-            <a:pPr algn="ctr"/>
-            <a:r>
-              <a:rPr lang="ko-KR" altLang="en-US" dirty="0"/>
-              <a:t>스케일</a:t>
-            </a:r>
-          </a:p>
-        </p:txBody>
-      </p:sp>
-      <p:sp>
-        <p:nvSpPr>
-          <p:cNvPr id="8" name="직사각형 7">
-            <a:extLst>
-              <a:ext uri="{FF2B5EF4-FFF2-40B4-BE49-F238E27FC236}">
-                <a16:creationId xmlns:a16="http://schemas.microsoft.com/office/drawing/2014/main" id="{206FFD4F-4574-4E15-95CC-29CB5650447C}"/>
-              </a:ext>
-            </a:extLst>
-          </p:cNvPr>
-          <p:cNvSpPr/>
-          <p:nvPr/>
-        </p:nvSpPr>
-        <p:spPr>
-          <a:xfrm>
-            <a:off x="3829050" y="3200401"/>
-            <a:ext cx="1977390" cy="822960"/>
-          </a:xfrm>
-          <a:prstGeom prst="rect">
-            <a:avLst/>
-          </a:prstGeom>
-        </p:spPr>
-        <p:style>
-          <a:lnRef idx="2">
-            <a:schemeClr val="dk1">
-              <a:shade val="50000"/>
-            </a:schemeClr>
-          </a:lnRef>
-          <a:fillRef idx="1">
-            <a:schemeClr val="dk1"/>
-          </a:fillRef>
-          <a:effectRef idx="0">
-            <a:schemeClr val="dk1"/>
-          </a:effectRef>
-          <a:fontRef idx="minor">
-            <a:schemeClr val="lt1"/>
-          </a:fontRef>
-        </p:style>
-        <p:txBody>
-          <a:bodyPr rtlCol="0" anchor="ctr"/>
-          <a:lstStyle/>
-          <a:p>
-            <a:pPr algn="ctr"/>
-            <a:r>
-              <a:rPr lang="ko-KR" altLang="en-US" dirty="0"/>
-              <a:t>테라인</a:t>
-            </a:r>
-          </a:p>
-        </p:txBody>
-      </p:sp>
-      <p:sp>
-        <p:nvSpPr>
           <p:cNvPr id="9" name="직사각형 8">
             <a:extLst>
               <a:ext uri="{FF2B5EF4-FFF2-40B4-BE49-F238E27FC236}">
@@ -7424,7 +7223,7 @@
         </p:nvSpPr>
         <p:spPr>
           <a:xfrm>
-            <a:off x="6244590" y="3200401"/>
+            <a:off x="4018225" y="2011680"/>
             <a:ext cx="1977390" cy="822960"/>
           </a:xfrm>
           <a:prstGeom prst="rect">

</xml_diff>